<commit_message>
Casmbios finales antes de curso
Cambios  generales para crear la primera version valida del curso.
</commit_message>
<xml_diff>
--- a/docs/otros/Guia Docente.pptx
+++ b/docs/otros/Guia Docente.pptx
@@ -137,7 +137,7 @@
 <file path=ppt/revisionInfo.xml><?xml version="1.0" encoding="utf-8"?>
 <p1510:revInfo xmlns:a="http://schemas.openxmlformats.org/drawingml/2006/main" xmlns:r="http://schemas.openxmlformats.org/officeDocument/2006/relationships" xmlns:p1510="http://schemas.microsoft.com/office/powerpoint/2015/10/main">
   <p1510:revLst>
-    <p1510:client id="{3FD108FA-C0B7-3842-BE3C-AD9481C949EE}" v="8" dt="2020-12-14T09:23:09.541"/>
+    <p1510:client id="{6FCBAC8D-E72C-5F4F-A285-CEA83E05685C}" v="1" dt="2021-01-08T09:34:48.707"/>
   </p1510:revLst>
 </p1510:revInfo>
 </file>
@@ -1173,6 +1173,60 @@
           <ac:spMkLst>
             <pc:docMk/>
             <pc:sldMk cId="1780462472" sldId="282"/>
+            <ac:spMk id="3" creationId="{00000000-0000-0000-0000-000000000000}"/>
+          </ac:spMkLst>
+        </pc:spChg>
+      </pc:sldChg>
+    </pc:docChg>
+  </pc:docChgLst>
+  <pc:docChgLst>
+    <pc:chgData name="Ivan Arribas Fernandez" userId="be159d82-138e-450b-ac0a-32a8f3edab35" providerId="ADAL" clId="{6FCBAC8D-E72C-5F4F-A285-CEA83E05685C}"/>
+    <pc:docChg chg="custSel modSld">
+      <pc:chgData name="Ivan Arribas Fernandez" userId="be159d82-138e-450b-ac0a-32a8f3edab35" providerId="ADAL" clId="{6FCBAC8D-E72C-5F4F-A285-CEA83E05685C}" dt="2021-01-08T09:35:41.806" v="83" actId="5793"/>
+      <pc:docMkLst>
+        <pc:docMk/>
+      </pc:docMkLst>
+      <pc:sldChg chg="modSp mod">
+        <pc:chgData name="Ivan Arribas Fernandez" userId="be159d82-138e-450b-ac0a-32a8f3edab35" providerId="ADAL" clId="{6FCBAC8D-E72C-5F4F-A285-CEA83E05685C}" dt="2021-01-08T09:33:18.073" v="8" actId="20577"/>
+        <pc:sldMkLst>
+          <pc:docMk/>
+          <pc:sldMk cId="2020806516" sldId="276"/>
+        </pc:sldMkLst>
+        <pc:spChg chg="mod">
+          <ac:chgData name="Ivan Arribas Fernandez" userId="be159d82-138e-450b-ac0a-32a8f3edab35" providerId="ADAL" clId="{6FCBAC8D-E72C-5F4F-A285-CEA83E05685C}" dt="2021-01-08T09:33:18.073" v="8" actId="20577"/>
+          <ac:spMkLst>
+            <pc:docMk/>
+            <pc:sldMk cId="2020806516" sldId="276"/>
+            <ac:spMk id="3" creationId="{00000000-0000-0000-0000-000000000000}"/>
+          </ac:spMkLst>
+        </pc:spChg>
+      </pc:sldChg>
+      <pc:sldChg chg="modSp mod">
+        <pc:chgData name="Ivan Arribas Fernandez" userId="be159d82-138e-450b-ac0a-32a8f3edab35" providerId="ADAL" clId="{6FCBAC8D-E72C-5F4F-A285-CEA83E05685C}" dt="2021-01-08T09:35:41.806" v="83" actId="5793"/>
+        <pc:sldMkLst>
+          <pc:docMk/>
+          <pc:sldMk cId="186384705" sldId="280"/>
+        </pc:sldMkLst>
+        <pc:spChg chg="mod">
+          <ac:chgData name="Ivan Arribas Fernandez" userId="be159d82-138e-450b-ac0a-32a8f3edab35" providerId="ADAL" clId="{6FCBAC8D-E72C-5F4F-A285-CEA83E05685C}" dt="2021-01-08T09:35:41.806" v="83" actId="5793"/>
+          <ac:spMkLst>
+            <pc:docMk/>
+            <pc:sldMk cId="186384705" sldId="280"/>
+            <ac:spMk id="3" creationId="{00000000-0000-0000-0000-000000000000}"/>
+          </ac:spMkLst>
+        </pc:spChg>
+      </pc:sldChg>
+      <pc:sldChg chg="modSp mod">
+        <pc:chgData name="Ivan Arribas Fernandez" userId="be159d82-138e-450b-ac0a-32a8f3edab35" providerId="ADAL" clId="{6FCBAC8D-E72C-5F4F-A285-CEA83E05685C}" dt="2021-01-08T09:33:43.732" v="11" actId="20577"/>
+        <pc:sldMkLst>
+          <pc:docMk/>
+          <pc:sldMk cId="3178911644" sldId="283"/>
+        </pc:sldMkLst>
+        <pc:spChg chg="mod">
+          <ac:chgData name="Ivan Arribas Fernandez" userId="be159d82-138e-450b-ac0a-32a8f3edab35" providerId="ADAL" clId="{6FCBAC8D-E72C-5F4F-A285-CEA83E05685C}" dt="2021-01-08T09:33:43.732" v="11" actId="20577"/>
+          <ac:spMkLst>
+            <pc:docMk/>
+            <pc:sldMk cId="3178911644" sldId="283"/>
             <ac:spMk id="3" creationId="{00000000-0000-0000-0000-000000000000}"/>
           </ac:spMkLst>
         </pc:spChg>
@@ -1264,7 +1318,7 @@
           <a:p>
             <a:fld id="{0514509D-DBC2-4581-947B-3A5CED726F29}" type="datetimeFigureOut">
               <a:rPr lang="es-ES" smtClean="0"/>
-              <a:t>14/12/20</a:t>
+              <a:t>8/1/21</a:t>
             </a:fld>
             <a:endParaRPr lang="es-ES"/>
           </a:p>
@@ -1808,7 +1862,7 @@
           <a:p>
             <a:fld id="{800D4C4D-9136-497F-83D9-49D52CCCD8BE}" type="datetime1">
               <a:rPr lang="es-ES" smtClean="0"/>
-              <a:t>14/12/20</a:t>
+              <a:t>8/1/21</a:t>
             </a:fld>
             <a:endParaRPr lang="es-ES"/>
           </a:p>
@@ -2018,7 +2072,7 @@
           <a:p>
             <a:fld id="{4B1544AB-5837-4982-94D4-FAA3CA29AF65}" type="datetime1">
               <a:rPr lang="es-ES" smtClean="0"/>
-              <a:t>14/12/20</a:t>
+              <a:t>8/1/21</a:t>
             </a:fld>
             <a:endParaRPr lang="es-ES"/>
           </a:p>
@@ -2193,7 +2247,7 @@
           <a:p>
             <a:fld id="{E8E54D38-30D9-4BF4-82D5-13F0E57A0F85}" type="datetime1">
               <a:rPr lang="es-ES" smtClean="0"/>
-              <a:t>14/12/20</a:t>
+              <a:t>8/1/21</a:t>
             </a:fld>
             <a:endParaRPr lang="es-ES"/>
           </a:p>
@@ -2414,7 +2468,7 @@
           <a:p>
             <a:fld id="{E4B9A560-E10B-4350-8FE8-946FC5714FA3}" type="datetime1">
               <a:rPr lang="es-ES" smtClean="0"/>
-              <a:t>14/12/20</a:t>
+              <a:t>8/1/21</a:t>
             </a:fld>
             <a:endParaRPr lang="es-ES"/>
           </a:p>
@@ -2661,7 +2715,7 @@
           <a:p>
             <a:fld id="{C9F2CDFB-1DD6-4289-B312-9FE549A0F732}" type="datetime1">
               <a:rPr lang="es-ES" smtClean="0"/>
-              <a:t>14/12/20</a:t>
+              <a:t>8/1/21</a:t>
             </a:fld>
             <a:endParaRPr lang="es-ES"/>
           </a:p>
@@ -2778,7 +2832,7 @@
           <a:p>
             <a:fld id="{777A1539-4B1E-4634-B8E0-5A5A4AB45A77}" type="datetime1">
               <a:rPr lang="es-ES" smtClean="0"/>
-              <a:t>14/12/20</a:t>
+              <a:t>8/1/21</a:t>
             </a:fld>
             <a:endParaRPr lang="es-ES"/>
           </a:p>
@@ -3143,7 +3197,7 @@
           <a:p>
             <a:fld id="{991B0F75-ADB3-481A-A2DE-3BBDE6C5347F}" type="datetime1">
               <a:rPr lang="es-ES" smtClean="0"/>
-              <a:t>14/12/20</a:t>
+              <a:t>8/1/21</a:t>
             </a:fld>
             <a:endParaRPr lang="es-ES"/>
           </a:p>
@@ -3374,7 +3428,7 @@
           <a:p>
             <a:fld id="{F4F06CED-6D03-4D1C-B18B-031F6B886FBF}" type="datetime1">
               <a:rPr lang="es-ES" smtClean="0"/>
-              <a:t>14/12/20</a:t>
+              <a:t>8/1/21</a:t>
             </a:fld>
             <a:endParaRPr lang="es-ES"/>
           </a:p>
@@ -3464,7 +3518,7 @@
           <a:p>
             <a:fld id="{ADDAD082-E6B9-4F72-8B26-FBEE32FDF76F}" type="datetime1">
               <a:rPr lang="es-ES" smtClean="0"/>
-              <a:t>14/12/20</a:t>
+              <a:t>8/1/21</a:t>
             </a:fld>
             <a:endParaRPr lang="es-ES"/>
           </a:p>
@@ -3723,7 +3777,7 @@
           <a:p>
             <a:fld id="{40ECAE2E-5227-429B-AD7D-B77994026986}" type="datetime1">
               <a:rPr lang="es-ES" smtClean="0"/>
-              <a:t>14/12/20</a:t>
+              <a:t>8/1/21</a:t>
             </a:fld>
             <a:endParaRPr lang="es-ES"/>
           </a:p>
@@ -3987,7 +4041,7 @@
           <a:p>
             <a:fld id="{C5160EC2-DA78-4304-A9C1-062C73098644}" type="datetime1">
               <a:rPr lang="es-ES" smtClean="0"/>
-              <a:t>14/12/20</a:t>
+              <a:t>8/1/21</a:t>
             </a:fld>
             <a:endParaRPr lang="es-ES"/>
           </a:p>
@@ -4521,7 +4575,7 @@
           <a:p>
             <a:fld id="{D5B34832-638B-4DAC-9E1F-E80827107D42}" type="datetime1">
               <a:rPr lang="es-ES" smtClean="0"/>
-              <a:t>14/12/20</a:t>
+              <a:t>8/1/21</a:t>
             </a:fld>
             <a:endParaRPr lang="es-ES"/>
           </a:p>
@@ -6626,7 +6680,7 @@
             <a:pPr marL="315913"/>
             <a:r>
               <a:rPr lang="es-ES" b="1" dirty="0"/>
-              <a:t>3. Métodos ingenuos de predicción. Evaluación de predicciones</a:t>
+              <a:t>3. Métodos sencillos de predicción. Evaluación de predicciones</a:t>
             </a:r>
           </a:p>
           <a:p>
@@ -7631,19 +7685,11 @@
             </a:r>
             <a:r>
               <a:rPr lang="es-ES_tradnl" sz="1600" dirty="0" err="1"/>
-              <a:t>Rstudio</a:t>
+              <a:t>RStudio</a:t>
             </a:r>
             <a:r>
               <a:rPr lang="es-ES_tradnl" sz="1600" dirty="0"/>
-              <a:t> </a:t>
-            </a:r>
-            <a:r>
-              <a:rPr lang="es-ES_tradnl" sz="1600" dirty="0" err="1"/>
-              <a:t>Descktop</a:t>
-            </a:r>
-            <a:r>
-              <a:rPr lang="es-ES_tradnl" sz="1600" dirty="0"/>
-              <a:t> “Free”</a:t>
+              <a:t> Desktop “Free”</a:t>
             </a:r>
           </a:p>
         </p:txBody>
@@ -7755,7 +7801,7 @@
         <p:spPr>
           <a:xfrm>
             <a:off x="899592" y="1147965"/>
-            <a:ext cx="7848872" cy="5016758"/>
+            <a:ext cx="7848872" cy="4093428"/>
           </a:xfrm>
           <a:prstGeom prst="rect">
             <a:avLst/>
@@ -7783,7 +7829,7 @@
             </a:pPr>
             <a:r>
               <a:rPr lang="es-ES" sz="2000" dirty="0"/>
-              <a:t>Tras cada una de las unidades temáticas se realizará en horario de clase una breve </a:t>
+              <a:t>Tras cada una de las unidades temáticas se realizará una </a:t>
             </a:r>
             <a:r>
               <a:rPr lang="es-ES" sz="2000" b="1" dirty="0"/>
@@ -7791,23 +7837,7 @@
             </a:r>
             <a:r>
               <a:rPr lang="es-ES" sz="2000" dirty="0"/>
-              <a:t>. La prueba contendrá preguntas de respuesta múltiple, numérica, verdadero/falso, etc. Este conjunto de pruebas supondrá un </a:t>
-            </a:r>
-            <a:r>
-              <a:rPr lang="es-ES" sz="2000" b="1" dirty="0"/>
-              <a:t>15% de la nota de la asignatura</a:t>
-            </a:r>
-            <a:r>
-              <a:rPr lang="es-ES" sz="2000" dirty="0"/>
-              <a:t>. Esta parte de la evaluación continua </a:t>
-            </a:r>
-            <a:r>
-              <a:rPr lang="es-ES" sz="2000" b="1" dirty="0"/>
-              <a:t>no es recuperable</a:t>
-            </a:r>
-            <a:r>
-              <a:rPr lang="es-ES" sz="2000" dirty="0"/>
-              <a:t>.</a:t>
+              <a:t>. La prueba contendrá preguntas de respuesta múltiple, numérica, verdadero/falso, etc.</a:t>
             </a:r>
           </a:p>
           <a:p>
@@ -7817,32 +7847,21 @@
             </a:pPr>
             <a:r>
               <a:rPr lang="es-ES" sz="2000" dirty="0"/>
-              <a:t>Además, tras cada unidad temática, se realizará una </a:t>
+              <a:t>La evaluación continua </a:t>
             </a:r>
             <a:r>
               <a:rPr lang="es-ES" sz="2000" b="1" dirty="0"/>
-              <a:t>práctica de evaluación </a:t>
-            </a:r>
-            <a:r>
-              <a:rPr lang="es-ES" sz="2000" dirty="0"/>
-              <a:t>que se deberá entregar en el plazo establecido. La valoración de estos trabajos supondrá un </a:t>
+              <a:t>es recuperable de cara a la </a:t>
+            </a:r>
+            <a:r>
+              <a:rPr lang="es-ES" sz="2000" b="1"/>
+              <a:t>segunda convocatoria</a:t>
             </a:r>
             <a:r>
               <a:rPr lang="es-ES" sz="2000" b="1" dirty="0"/>
-              <a:t>45% de la nota de la asignatura</a:t>
-            </a:r>
-            <a:r>
-              <a:rPr lang="es-ES" sz="2000" dirty="0"/>
-              <a:t>. Esta parte de la evaluación continua </a:t>
-            </a:r>
-            <a:r>
-              <a:rPr lang="es-ES" sz="2000" b="1" dirty="0"/>
-              <a:t>es recuperable</a:t>
-            </a:r>
-            <a:r>
-              <a:rPr lang="es-ES" sz="2000" dirty="0"/>
               <a:t>.</a:t>
             </a:r>
+            <a:endParaRPr lang="es-ES" sz="2000" dirty="0"/>
           </a:p>
           <a:p>
             <a:endParaRPr lang="es-ES" sz="2000" dirty="0"/>
@@ -7854,19 +7873,32 @@
             </a:r>
             <a:r>
               <a:rPr lang="es-ES" sz="2000" b="1" dirty="0"/>
-              <a:t>examen que supondrá el restante 40%</a:t>
+              <a:t>examen escrito que supondrá el restante 40%</a:t>
             </a:r>
             <a:r>
               <a:rPr lang="es-ES" sz="2000" dirty="0"/>
-              <a:t> de la nota de la asignatura. El examen tendrá tanto apartados de teoría como preguntas prácticas.</a:t>
+              <a:t> de la nota de la asignatura.</a:t>
             </a:r>
           </a:p>
           <a:p>
             <a:pPr marL="342900" indent="-342900">
-              <a:buFont typeface="Arial"/>
+              <a:buFont typeface="Arial" panose="020B0604020202020204" pitchFamily="34" charset="0"/>
               <a:buChar char="•"/>
             </a:pPr>
-            <a:endParaRPr lang="es-ES_tradnl" sz="2000" dirty="0"/>
+            <a:r>
+              <a:rPr lang="es-ES" sz="2000" dirty="0"/>
+              <a:t>El examen tendrá tanto apartados de teoría como preguntas prácticas.</a:t>
+            </a:r>
+          </a:p>
+          <a:p>
+            <a:pPr marL="342900" indent="-342900">
+              <a:buFont typeface="Arial" panose="020B0604020202020204" pitchFamily="34" charset="0"/>
+              <a:buChar char="•"/>
+            </a:pPr>
+            <a:r>
+              <a:rPr lang="es-ES" sz="2000" dirty="0"/>
+              <a:t>Será condición imprescindible para la superación de la asignatura aprobar el examen escrito.</a:t>
+            </a:r>
           </a:p>
         </p:txBody>
       </p:sp>

</xml_diff>